<commit_message>
Updated Presentation style and added team photo
</commit_message>
<xml_diff>
--- a/Presentation/HotelSys.pptx
+++ b/Presentation/HotelSys.pptx
@@ -6,14 +6,15 @@
   </p:sldMasterIdLst>
   <p:sldIdLst>
     <p:sldId id="256" r:id="rId2"/>
-    <p:sldId id="257" r:id="rId3"/>
-    <p:sldId id="261" r:id="rId4"/>
-    <p:sldId id="259" r:id="rId5"/>
-    <p:sldId id="263" r:id="rId6"/>
-    <p:sldId id="264" r:id="rId7"/>
-    <p:sldId id="265" r:id="rId8"/>
-    <p:sldId id="266" r:id="rId9"/>
-    <p:sldId id="258" r:id="rId10"/>
+    <p:sldId id="267" r:id="rId3"/>
+    <p:sldId id="257" r:id="rId4"/>
+    <p:sldId id="261" r:id="rId5"/>
+    <p:sldId id="259" r:id="rId6"/>
+    <p:sldId id="263" r:id="rId7"/>
+    <p:sldId id="264" r:id="rId8"/>
+    <p:sldId id="265" r:id="rId9"/>
+    <p:sldId id="266" r:id="rId10"/>
+    <p:sldId id="258" r:id="rId11"/>
   </p:sldIdLst>
   <p:sldSz cx="9144000" cy="6858000" type="screen4x3"/>
   <p:notesSz cx="6858000" cy="9144000"/>
@@ -3566,7 +3567,297 @@
 </p:sld>
 </file>
 
+<file path=ppt/slides/slide10.xml><?xml version="1.0" encoding="utf-8"?>
+<p:sld xmlns:a="http://schemas.openxmlformats.org/drawingml/2006/main" xmlns:r="http://schemas.openxmlformats.org/officeDocument/2006/relationships" xmlns:p="http://schemas.openxmlformats.org/presentationml/2006/main">
+  <p:cSld>
+    <p:spTree>
+      <p:nvGrpSpPr>
+        <p:cNvPr id="1" name=""/>
+        <p:cNvGrpSpPr/>
+        <p:nvPr/>
+      </p:nvGrpSpPr>
+      <p:grpSpPr>
+        <a:xfrm>
+          <a:off x="0" y="0"/>
+          <a:ext cx="0" cy="0"/>
+          <a:chOff x="0" y="0"/>
+          <a:chExt cx="0" cy="0"/>
+        </a:xfrm>
+      </p:grpSpPr>
+      <p:sp>
+        <p:nvSpPr>
+          <p:cNvPr id="3" name="Заглавие 2"/>
+          <p:cNvSpPr>
+            <a:spLocks noGrp="1"/>
+          </p:cNvSpPr>
+          <p:nvPr>
+            <p:ph type="title"/>
+          </p:nvPr>
+        </p:nvSpPr>
+        <p:spPr/>
+        <p:txBody>
+          <a:bodyPr/>
+          <a:lstStyle/>
+          <a:p>
+            <a:r>
+              <a:rPr lang="bg-BG" dirty="0"/>
+              <a:t>Край</a:t>
+            </a:r>
+            <a:endParaRPr lang="en-US" dirty="0"/>
+          </a:p>
+        </p:txBody>
+      </p:sp>
+      <p:sp>
+        <p:nvSpPr>
+          <p:cNvPr id="2" name="Контейнер за съдържание 1"/>
+          <p:cNvSpPr>
+            <a:spLocks noGrp="1"/>
+          </p:cNvSpPr>
+          <p:nvPr>
+            <p:ph idx="1"/>
+          </p:nvPr>
+        </p:nvSpPr>
+        <p:spPr>
+          <a:xfrm>
+            <a:off x="867833" y="2157731"/>
+            <a:ext cx="7408333" cy="3962399"/>
+          </a:xfrm>
+        </p:spPr>
+        <p:txBody>
+          <a:bodyPr>
+            <a:normAutofit/>
+          </a:bodyPr>
+          <a:lstStyle/>
+          <a:p>
+            <a:pPr marL="0" indent="0">
+              <a:buNone/>
+            </a:pPr>
+            <a:r>
+              <a:rPr lang="bg-BG" dirty="0"/>
+              <a:t>По проекта работиха:</a:t>
+            </a:r>
+          </a:p>
+          <a:p>
+            <a:r>
+              <a:rPr lang="bg-BG" dirty="0"/>
+              <a:t>Емил Йорданов</a:t>
+            </a:r>
+          </a:p>
+          <a:p>
+            <a:r>
+              <a:rPr lang="bg-BG" dirty="0"/>
+              <a:t>Кристиан Тодоров</a:t>
+            </a:r>
+          </a:p>
+          <a:p>
+            <a:r>
+              <a:rPr lang="bg-BG" dirty="0"/>
+              <a:t>Иван Досев</a:t>
+            </a:r>
+          </a:p>
+          <a:p>
+            <a:r>
+              <a:rPr lang="bg-BG" dirty="0"/>
+              <a:t>Мирослав Петров</a:t>
+            </a:r>
+          </a:p>
+          <a:p>
+            <a:r>
+              <a:rPr lang="bg-BG" dirty="0"/>
+              <a:t>Василена Димитрова</a:t>
+            </a:r>
+          </a:p>
+          <a:p>
+            <a:r>
+              <a:rPr lang="bg-BG" dirty="0"/>
+              <a:t>Иван Недков</a:t>
+            </a:r>
+          </a:p>
+          <a:p>
+            <a:r>
+              <a:rPr lang="bg-BG" dirty="0"/>
+              <a:t>Даниел Николов</a:t>
+            </a:r>
+            <a:endParaRPr lang="en-US" dirty="0"/>
+          </a:p>
+        </p:txBody>
+      </p:sp>
+      <p:pic>
+        <p:nvPicPr>
+          <p:cNvPr id="5" name="Picture 3" descr="C:\Users\User\Desktop\dark blue logo.png"/>
+          <p:cNvPicPr>
+            <a:picLocks noChangeAspect="1" noChangeArrowheads="1"/>
+          </p:cNvPicPr>
+          <p:nvPr/>
+        </p:nvPicPr>
+        <p:blipFill>
+          <a:blip r:embed="rId2">
+            <a:extLst>
+              <a:ext uri="{28A0092B-C50C-407E-A947-70E740481C1C}">
+                <a14:useLocalDpi xmlns:a14="http://schemas.microsoft.com/office/drawing/2010/main" val="0"/>
+              </a:ext>
+            </a:extLst>
+          </a:blip>
+          <a:srcRect/>
+          <a:stretch>
+            <a:fillRect/>
+          </a:stretch>
+        </p:blipFill>
+        <p:spPr bwMode="auto">
+          <a:xfrm>
+            <a:off x="6724794" y="5872650"/>
+            <a:ext cx="2419206" cy="985350"/>
+          </a:xfrm>
+          <a:prstGeom prst="rect">
+            <a:avLst/>
+          </a:prstGeom>
+          <a:noFill/>
+          <a:extLst>
+            <a:ext uri="{909E8E84-426E-40DD-AFC4-6F175D3DCCD1}">
+              <a14:hiddenFill xmlns:a14="http://schemas.microsoft.com/office/drawing/2010/main">
+                <a:solidFill>
+                  <a:srgbClr val="FFFFFF"/>
+                </a:solidFill>
+              </a14:hiddenFill>
+            </a:ext>
+          </a:extLst>
+        </p:spPr>
+      </p:pic>
+    </p:spTree>
+    <p:extLst>
+      <p:ext uri="{BB962C8B-B14F-4D97-AF65-F5344CB8AC3E}">
+        <p14:creationId xmlns:p14="http://schemas.microsoft.com/office/powerpoint/2010/main" val="4022454521"/>
+      </p:ext>
+    </p:extLst>
+  </p:cSld>
+  <p:clrMapOvr>
+    <a:masterClrMapping/>
+  </p:clrMapOvr>
+</p:sld>
+</file>
+
 <file path=ppt/slides/slide2.xml><?xml version="1.0" encoding="utf-8"?>
+<p:sld xmlns:a="http://schemas.openxmlformats.org/drawingml/2006/main" xmlns:r="http://schemas.openxmlformats.org/officeDocument/2006/relationships" xmlns:p="http://schemas.openxmlformats.org/presentationml/2006/main">
+  <p:cSld>
+    <p:spTree>
+      <p:nvGrpSpPr>
+        <p:cNvPr id="1" name=""/>
+        <p:cNvGrpSpPr/>
+        <p:nvPr/>
+      </p:nvGrpSpPr>
+      <p:grpSpPr>
+        <a:xfrm>
+          <a:off x="0" y="0"/>
+          <a:ext cx="0" cy="0"/>
+          <a:chOff x="0" y="0"/>
+          <a:chExt cx="0" cy="0"/>
+        </a:xfrm>
+      </p:grpSpPr>
+      <p:pic>
+        <p:nvPicPr>
+          <p:cNvPr id="5" name="Content Placeholder 4" descr="A group of people posing for a photo&#10;&#10;Description automatically generated">
+            <a:extLst>
+              <a:ext uri="{FF2B5EF4-FFF2-40B4-BE49-F238E27FC236}">
+                <a16:creationId xmlns:a16="http://schemas.microsoft.com/office/drawing/2014/main" id="{EFC73766-E8AE-4446-945F-0CB52F3085EA}"/>
+              </a:ext>
+            </a:extLst>
+          </p:cNvPr>
+          <p:cNvPicPr>
+            <a:picLocks noGrp="1" noChangeAspect="1"/>
+          </p:cNvPicPr>
+          <p:nvPr>
+            <p:ph idx="1"/>
+          </p:nvPr>
+        </p:nvPicPr>
+        <p:blipFill>
+          <a:blip r:embed="rId2">
+            <a:extLst>
+              <a:ext uri="{28A0092B-C50C-407E-A947-70E740481C1C}">
+                <a14:useLocalDpi xmlns:a14="http://schemas.microsoft.com/office/drawing/2010/main" val="0"/>
+              </a:ext>
+            </a:extLst>
+          </a:blip>
+          <a:stretch>
+            <a:fillRect/>
+          </a:stretch>
+        </p:blipFill>
+        <p:spPr>
+          <a:xfrm>
+            <a:off x="987822" y="740866"/>
+            <a:ext cx="7168356" cy="5376268"/>
+          </a:xfrm>
+          <a:prstGeom prst="ellipse">
+            <a:avLst/>
+          </a:prstGeom>
+          <a:ln>
+            <a:noFill/>
+          </a:ln>
+          <a:effectLst>
+            <a:softEdge rad="112500"/>
+          </a:effectLst>
+        </p:spPr>
+      </p:pic>
+      <p:pic>
+        <p:nvPicPr>
+          <p:cNvPr id="6" name="Picture 3" descr="C:\Users\User\Desktop\dark blue logo.png">
+            <a:extLst>
+              <a:ext uri="{FF2B5EF4-FFF2-40B4-BE49-F238E27FC236}">
+                <a16:creationId xmlns:a16="http://schemas.microsoft.com/office/drawing/2014/main" id="{BA627B2F-BF17-492E-B187-C6AD1B9C8461}"/>
+              </a:ext>
+            </a:extLst>
+          </p:cNvPr>
+          <p:cNvPicPr>
+            <a:picLocks noChangeAspect="1" noChangeArrowheads="1"/>
+          </p:cNvPicPr>
+          <p:nvPr/>
+        </p:nvPicPr>
+        <p:blipFill>
+          <a:blip r:embed="rId3">
+            <a:extLst>
+              <a:ext uri="{28A0092B-C50C-407E-A947-70E740481C1C}">
+                <a14:useLocalDpi xmlns:a14="http://schemas.microsoft.com/office/drawing/2010/main" val="0"/>
+              </a:ext>
+            </a:extLst>
+          </a:blip>
+          <a:srcRect/>
+          <a:stretch>
+            <a:fillRect/>
+          </a:stretch>
+        </p:blipFill>
+        <p:spPr bwMode="auto">
+          <a:xfrm>
+            <a:off x="6724794" y="5872650"/>
+            <a:ext cx="2419206" cy="985350"/>
+          </a:xfrm>
+          <a:prstGeom prst="rect">
+            <a:avLst/>
+          </a:prstGeom>
+          <a:noFill/>
+          <a:extLst>
+            <a:ext uri="{909E8E84-426E-40DD-AFC4-6F175D3DCCD1}">
+              <a14:hiddenFill xmlns:a14="http://schemas.microsoft.com/office/drawing/2010/main">
+                <a:solidFill>
+                  <a:srgbClr val="FFFFFF"/>
+                </a:solidFill>
+              </a14:hiddenFill>
+            </a:ext>
+          </a:extLst>
+        </p:spPr>
+      </p:pic>
+    </p:spTree>
+    <p:extLst>
+      <p:ext uri="{BB962C8B-B14F-4D97-AF65-F5344CB8AC3E}">
+        <p14:creationId xmlns:p14="http://schemas.microsoft.com/office/powerpoint/2010/main" val="3287765781"/>
+      </p:ext>
+    </p:extLst>
+  </p:cSld>
+  <p:clrMapOvr>
+    <a:masterClrMapping/>
+  </p:clrMapOvr>
+</p:sld>
+</file>
+
+<file path=ppt/slides/slide3.xml><?xml version="1.0" encoding="utf-8"?>
 <p:sld xmlns:a="http://schemas.openxmlformats.org/drawingml/2006/main" xmlns:r="http://schemas.openxmlformats.org/officeDocument/2006/relationships" xmlns:p="http://schemas.openxmlformats.org/presentationml/2006/main">
   <p:cSld>
     <p:spTree>
@@ -3703,7 +3994,7 @@
 </p:sld>
 </file>
 
-<file path=ppt/slides/slide3.xml><?xml version="1.0" encoding="utf-8"?>
+<file path=ppt/slides/slide4.xml><?xml version="1.0" encoding="utf-8"?>
 <p:sld xmlns:a="http://schemas.openxmlformats.org/drawingml/2006/main" xmlns:r="http://schemas.openxmlformats.org/officeDocument/2006/relationships" xmlns:p="http://schemas.openxmlformats.org/presentationml/2006/main">
   <p:cSld>
     <p:spTree>
@@ -3856,7 +4147,7 @@
 </p:sld>
 </file>
 
-<file path=ppt/slides/slide4.xml><?xml version="1.0" encoding="utf-8"?>
+<file path=ppt/slides/slide5.xml><?xml version="1.0" encoding="utf-8"?>
 <p:sld xmlns:a="http://schemas.openxmlformats.org/drawingml/2006/main" xmlns:r="http://schemas.openxmlformats.org/officeDocument/2006/relationships" xmlns:p="http://schemas.openxmlformats.org/presentationml/2006/main">
   <p:cSld>
     <p:spTree>
@@ -4010,7 +4301,7 @@
 </p:sld>
 </file>
 
-<file path=ppt/slides/slide5.xml><?xml version="1.0" encoding="utf-8"?>
+<file path=ppt/slides/slide6.xml><?xml version="1.0" encoding="utf-8"?>
 <p:sld xmlns:a="http://schemas.openxmlformats.org/drawingml/2006/main" xmlns:r="http://schemas.openxmlformats.org/officeDocument/2006/relationships" xmlns:p="http://schemas.openxmlformats.org/presentationml/2006/main">
   <p:cSld>
     <p:spTree>
@@ -4152,7 +4443,7 @@
 </p:sld>
 </file>
 
-<file path=ppt/slides/slide6.xml><?xml version="1.0" encoding="utf-8"?>
+<file path=ppt/slides/slide7.xml><?xml version="1.0" encoding="utf-8"?>
 <p:sld xmlns:a="http://schemas.openxmlformats.org/drawingml/2006/main" xmlns:r="http://schemas.openxmlformats.org/officeDocument/2006/relationships" xmlns:p="http://schemas.openxmlformats.org/presentationml/2006/main">
   <p:cSld>
     <p:spTree>
@@ -4310,7 +4601,7 @@
 </p:sld>
 </file>
 
-<file path=ppt/slides/slide7.xml><?xml version="1.0" encoding="utf-8"?>
+<file path=ppt/slides/slide8.xml><?xml version="1.0" encoding="utf-8"?>
 <p:sld xmlns:a="http://schemas.openxmlformats.org/drawingml/2006/main" xmlns:r="http://schemas.openxmlformats.org/officeDocument/2006/relationships" xmlns:p="http://schemas.openxmlformats.org/presentationml/2006/main">
   <p:cSld>
     <p:spTree>
@@ -4464,7 +4755,7 @@
 </p:sld>
 </file>
 
-<file path=ppt/slides/slide8.xml><?xml version="1.0" encoding="utf-8"?>
+<file path=ppt/slides/slide9.xml><?xml version="1.0" encoding="utf-8"?>
 <p:sld xmlns:a="http://schemas.openxmlformats.org/drawingml/2006/main" xmlns:r="http://schemas.openxmlformats.org/officeDocument/2006/relationships" xmlns:p="http://schemas.openxmlformats.org/presentationml/2006/main">
   <p:cSld>
     <p:spTree>
@@ -4609,175 +4900,6 @@
     <p:extLst>
       <p:ext uri="{BB962C8B-B14F-4D97-AF65-F5344CB8AC3E}">
         <p14:creationId xmlns:p14="http://schemas.microsoft.com/office/powerpoint/2010/main" val="26633034"/>
-      </p:ext>
-    </p:extLst>
-  </p:cSld>
-  <p:clrMapOvr>
-    <a:masterClrMapping/>
-  </p:clrMapOvr>
-</p:sld>
-</file>
-
-<file path=ppt/slides/slide9.xml><?xml version="1.0" encoding="utf-8"?>
-<p:sld xmlns:a="http://schemas.openxmlformats.org/drawingml/2006/main" xmlns:r="http://schemas.openxmlformats.org/officeDocument/2006/relationships" xmlns:p="http://schemas.openxmlformats.org/presentationml/2006/main">
-  <p:cSld>
-    <p:spTree>
-      <p:nvGrpSpPr>
-        <p:cNvPr id="1" name=""/>
-        <p:cNvGrpSpPr/>
-        <p:nvPr/>
-      </p:nvGrpSpPr>
-      <p:grpSpPr>
-        <a:xfrm>
-          <a:off x="0" y="0"/>
-          <a:ext cx="0" cy="0"/>
-          <a:chOff x="0" y="0"/>
-          <a:chExt cx="0" cy="0"/>
-        </a:xfrm>
-      </p:grpSpPr>
-      <p:sp>
-        <p:nvSpPr>
-          <p:cNvPr id="3" name="Заглавие 2"/>
-          <p:cNvSpPr>
-            <a:spLocks noGrp="1"/>
-          </p:cNvSpPr>
-          <p:nvPr>
-            <p:ph type="title"/>
-          </p:nvPr>
-        </p:nvSpPr>
-        <p:spPr/>
-        <p:txBody>
-          <a:bodyPr/>
-          <a:lstStyle/>
-          <a:p>
-            <a:r>
-              <a:rPr lang="bg-BG" dirty="0"/>
-              <a:t>Край</a:t>
-            </a:r>
-            <a:endParaRPr lang="en-US" dirty="0"/>
-          </a:p>
-        </p:txBody>
-      </p:sp>
-      <p:sp>
-        <p:nvSpPr>
-          <p:cNvPr id="2" name="Контейнер за съдържание 1"/>
-          <p:cNvSpPr>
-            <a:spLocks noGrp="1"/>
-          </p:cNvSpPr>
-          <p:nvPr>
-            <p:ph idx="1"/>
-          </p:nvPr>
-        </p:nvSpPr>
-        <p:spPr>
-          <a:xfrm>
-            <a:off x="867833" y="2157731"/>
-            <a:ext cx="7408333" cy="3962399"/>
-          </a:xfrm>
-        </p:spPr>
-        <p:txBody>
-          <a:bodyPr>
-            <a:normAutofit/>
-          </a:bodyPr>
-          <a:lstStyle/>
-          <a:p>
-            <a:pPr marL="0" indent="0">
-              <a:buNone/>
-            </a:pPr>
-            <a:r>
-              <a:rPr lang="bg-BG" dirty="0"/>
-              <a:t>По проекта работиха:</a:t>
-            </a:r>
-          </a:p>
-          <a:p>
-            <a:r>
-              <a:rPr lang="bg-BG" dirty="0"/>
-              <a:t>Емил Йорданов</a:t>
-            </a:r>
-          </a:p>
-          <a:p>
-            <a:r>
-              <a:rPr lang="bg-BG" dirty="0"/>
-              <a:t>Кристиан Тодоров</a:t>
-            </a:r>
-          </a:p>
-          <a:p>
-            <a:r>
-              <a:rPr lang="bg-BG" dirty="0"/>
-              <a:t>Иван Досев</a:t>
-            </a:r>
-          </a:p>
-          <a:p>
-            <a:r>
-              <a:rPr lang="bg-BG" dirty="0"/>
-              <a:t>Мирослав Петров</a:t>
-            </a:r>
-          </a:p>
-          <a:p>
-            <a:r>
-              <a:rPr lang="bg-BG" dirty="0"/>
-              <a:t>Василена Димитрова</a:t>
-            </a:r>
-          </a:p>
-          <a:p>
-            <a:r>
-              <a:rPr lang="bg-BG" dirty="0"/>
-              <a:t>Иван Недков</a:t>
-            </a:r>
-          </a:p>
-          <a:p>
-            <a:r>
-              <a:rPr lang="bg-BG" dirty="0"/>
-              <a:t>Даниел Николов</a:t>
-            </a:r>
-            <a:endParaRPr lang="en-US" dirty="0"/>
-          </a:p>
-        </p:txBody>
-      </p:sp>
-      <p:pic>
-        <p:nvPicPr>
-          <p:cNvPr id="5" name="Picture 3" descr="C:\Users\User\Desktop\dark blue logo.png"/>
-          <p:cNvPicPr>
-            <a:picLocks noChangeAspect="1" noChangeArrowheads="1"/>
-          </p:cNvPicPr>
-          <p:nvPr/>
-        </p:nvPicPr>
-        <p:blipFill>
-          <a:blip r:embed="rId2">
-            <a:extLst>
-              <a:ext uri="{28A0092B-C50C-407E-A947-70E740481C1C}">
-                <a14:useLocalDpi xmlns:a14="http://schemas.microsoft.com/office/drawing/2010/main" val="0"/>
-              </a:ext>
-            </a:extLst>
-          </a:blip>
-          <a:srcRect/>
-          <a:stretch>
-            <a:fillRect/>
-          </a:stretch>
-        </p:blipFill>
-        <p:spPr bwMode="auto">
-          <a:xfrm>
-            <a:off x="6724794" y="5872650"/>
-            <a:ext cx="2419206" cy="985350"/>
-          </a:xfrm>
-          <a:prstGeom prst="rect">
-            <a:avLst/>
-          </a:prstGeom>
-          <a:noFill/>
-          <a:extLst>
-            <a:ext uri="{909E8E84-426E-40DD-AFC4-6F175D3DCCD1}">
-              <a14:hiddenFill xmlns:a14="http://schemas.microsoft.com/office/drawing/2010/main">
-                <a:solidFill>
-                  <a:srgbClr val="FFFFFF"/>
-                </a:solidFill>
-              </a14:hiddenFill>
-            </a:ext>
-          </a:extLst>
-        </p:spPr>
-      </p:pic>
-    </p:spTree>
-    <p:extLst>
-      <p:ext uri="{BB962C8B-B14F-4D97-AF65-F5344CB8AC3E}">
-        <p14:creationId xmlns:p14="http://schemas.microsoft.com/office/powerpoint/2010/main" val="4022454521"/>
       </p:ext>
     </p:extLst>
   </p:cSld>

</xml_diff>

<commit_message>
Updated team roles in PPTX file
</commit_message>
<xml_diff>
--- a/Presentation/HotelSys.pptx
+++ b/Presentation/HotelSys.pptx
@@ -3640,7 +3640,23 @@
           <a:p>
             <a:r>
               <a:rPr lang="bg-BG" dirty="0"/>
-              <a:t>Емил Йорданов</a:t>
+              <a:t>Емил Йорданов - </a:t>
+            </a:r>
+            <a:r>
+              <a:rPr lang="en-US" dirty="0"/>
+              <a:t>C#/ HTML/ CSS</a:t>
+            </a:r>
+            <a:r>
+              <a:rPr lang="bg-BG" dirty="0"/>
+              <a:t> </a:t>
+            </a:r>
+            <a:r>
+              <a:rPr lang="en-US" dirty="0"/>
+              <a:t>dev</a:t>
+            </a:r>
+            <a:r>
+              <a:rPr lang="bg-BG" dirty="0"/>
+              <a:t>, презентатор</a:t>
             </a:r>
           </a:p>
           <a:p>
@@ -3648,35 +3664,82 @@
               <a:rPr lang="bg-BG" dirty="0"/>
               <a:t>Кристиан Тодоров</a:t>
             </a:r>
+            <a:r>
+              <a:rPr lang="en-US" dirty="0"/>
+              <a:t> – C#/ HTML/ CSS/ JS dev</a:t>
+            </a:r>
+            <a:endParaRPr lang="bg-BG" dirty="0"/>
           </a:p>
           <a:p>
             <a:r>
               <a:rPr lang="bg-BG" dirty="0"/>
-              <a:t>Иван Досев</a:t>
-            </a:r>
+              <a:t>Иван Досев – Дизайнер, Тестер, </a:t>
+            </a:r>
+            <a:r>
+              <a:rPr lang="en-US" dirty="0"/>
+              <a:t>PowerPoint master</a:t>
+            </a:r>
+            <a:endParaRPr lang="bg-BG" dirty="0"/>
           </a:p>
           <a:p>
             <a:r>
               <a:rPr lang="bg-BG" dirty="0"/>
-              <a:t>Мирослав Петров</a:t>
-            </a:r>
+              <a:t>Мирослав Петров – </a:t>
+            </a:r>
+            <a:r>
+              <a:rPr lang="en-US"/>
+              <a:t>C#/ HTML</a:t>
+            </a:r>
+            <a:r>
+              <a:rPr lang="en-US" dirty="0"/>
+              <a:t>/ </a:t>
+            </a:r>
+            <a:r>
+              <a:rPr lang="en-US"/>
+              <a:t>CSS dev</a:t>
+            </a:r>
+            <a:endParaRPr lang="bg-BG" dirty="0"/>
           </a:p>
           <a:p>
             <a:r>
               <a:rPr lang="bg-BG" dirty="0"/>
               <a:t>Василена Димитрова</a:t>
             </a:r>
+            <a:r>
+              <a:rPr lang="en-US" dirty="0"/>
+              <a:t> – </a:t>
+            </a:r>
+            <a:r>
+              <a:rPr lang="bg-BG" dirty="0"/>
+              <a:t>Тестер и Дизайнер</a:t>
+            </a:r>
           </a:p>
           <a:p>
             <a:r>
               <a:rPr lang="bg-BG" dirty="0"/>
               <a:t>Иван Недков</a:t>
             </a:r>
+            <a:r>
+              <a:rPr lang="en-US" dirty="0"/>
+              <a:t> - </a:t>
+            </a:r>
+            <a:r>
+              <a:rPr lang="bg-BG" dirty="0"/>
+              <a:t>Тестер</a:t>
+            </a:r>
           </a:p>
           <a:p>
             <a:r>
               <a:rPr lang="bg-BG" dirty="0"/>
               <a:t>Даниел Николов</a:t>
+            </a:r>
+            <a:r>
+              <a:rPr lang="en-US" dirty="0"/>
+              <a:t> - </a:t>
+            </a:r>
+            <a:r>
+              <a:rPr lang="bg-BG" dirty="0"/>
+              <a:t>Тестер</a:t>
             </a:r>
             <a:endParaRPr lang="en-US" dirty="0"/>
           </a:p>

</xml_diff>

<commit_message>
Updated PPTX and fixed some bugs
</commit_message>
<xml_diff>
--- a/Presentation/HotelSys.pptx
+++ b/Presentation/HotelSys.pptx
@@ -14,7 +14,9 @@
     <p:sldId id="264" r:id="rId8"/>
     <p:sldId id="265" r:id="rId9"/>
     <p:sldId id="266" r:id="rId10"/>
-    <p:sldId id="258" r:id="rId11"/>
+    <p:sldId id="268" r:id="rId11"/>
+    <p:sldId id="269" r:id="rId12"/>
+    <p:sldId id="258" r:id="rId13"/>
   </p:sldIdLst>
   <p:sldSz cx="9144000" cy="6858000" type="screen4x3"/>
   <p:notesSz cx="6858000" cy="9144000"/>
@@ -3586,6 +3588,284 @@
       </p:grpSpPr>
       <p:sp>
         <p:nvSpPr>
+          <p:cNvPr id="2" name="Title 1">
+            <a:extLst>
+              <a:ext uri="{FF2B5EF4-FFF2-40B4-BE49-F238E27FC236}">
+                <a16:creationId xmlns:a16="http://schemas.microsoft.com/office/drawing/2014/main" id="{A43E98DF-F2EA-4692-8C63-A6E8BF56AAB2}"/>
+              </a:ext>
+            </a:extLst>
+          </p:cNvPr>
+          <p:cNvSpPr>
+            <a:spLocks noGrp="1"/>
+          </p:cNvSpPr>
+          <p:nvPr>
+            <p:ph type="title"/>
+          </p:nvPr>
+        </p:nvSpPr>
+        <p:spPr/>
+        <p:txBody>
+          <a:bodyPr/>
+          <a:lstStyle/>
+          <a:p>
+            <a:r>
+              <a:rPr lang="en-US" dirty="0"/>
+              <a:t>GITHUB…</a:t>
+            </a:r>
+          </a:p>
+        </p:txBody>
+      </p:sp>
+      <p:sp>
+        <p:nvSpPr>
+          <p:cNvPr id="3" name="Content Placeholder 2">
+            <a:extLst>
+              <a:ext uri="{FF2B5EF4-FFF2-40B4-BE49-F238E27FC236}">
+                <a16:creationId xmlns:a16="http://schemas.microsoft.com/office/drawing/2014/main" id="{BC2B1F24-19CF-4A52-9EDD-895BD18F82BE}"/>
+              </a:ext>
+            </a:extLst>
+          </p:cNvPr>
+          <p:cNvSpPr>
+            <a:spLocks noGrp="1"/>
+          </p:cNvSpPr>
+          <p:nvPr>
+            <p:ph idx="1"/>
+          </p:nvPr>
+        </p:nvSpPr>
+        <p:spPr/>
+        <p:txBody>
+          <a:bodyPr/>
+          <a:lstStyle/>
+          <a:p>
+            <a:pPr algn="just"/>
+            <a:r>
+              <a:rPr lang="bg-BG" dirty="0"/>
+              <a:t>За контрол на версиите на проекта използвахме </a:t>
+            </a:r>
+            <a:r>
+              <a:rPr lang="en-US" dirty="0"/>
+              <a:t>GITHUB </a:t>
+            </a:r>
+            <a:r>
+              <a:rPr lang="bg-BG" dirty="0"/>
+              <a:t>и </a:t>
+            </a:r>
+            <a:r>
+              <a:rPr lang="en-US" dirty="0"/>
+              <a:t>GIT. </a:t>
+            </a:r>
+            <a:r>
+              <a:rPr lang="bg-BG" dirty="0"/>
+              <a:t>Той е отворен за промени чрез </a:t>
+            </a:r>
+            <a:r>
+              <a:rPr lang="en-US" dirty="0"/>
+              <a:t>Pull</a:t>
+            </a:r>
+            <a:r>
+              <a:rPr lang="bg-BG" dirty="0"/>
+              <a:t> заявки към виртуалното хранилище.</a:t>
+            </a:r>
+            <a:endParaRPr lang="en-US" dirty="0"/>
+          </a:p>
+          <a:p>
+            <a:endParaRPr lang="en-US" dirty="0"/>
+          </a:p>
+          <a:p>
+            <a:endParaRPr lang="en-US" dirty="0"/>
+          </a:p>
+          <a:p>
+            <a:pPr algn="ctr"/>
+            <a:r>
+              <a:rPr lang="bg-BG" dirty="0"/>
+              <a:t>Линк към проекта </a:t>
+            </a:r>
+            <a:r>
+              <a:rPr lang="bg-BG" dirty="0">
+                <a:hlinkClick r:id="rId2"/>
+              </a:rPr>
+              <a:t>тук...</a:t>
+            </a:r>
+            <a:endParaRPr lang="en-US" dirty="0"/>
+          </a:p>
+        </p:txBody>
+      </p:sp>
+    </p:spTree>
+    <p:extLst>
+      <p:ext uri="{BB962C8B-B14F-4D97-AF65-F5344CB8AC3E}">
+        <p14:creationId xmlns:p14="http://schemas.microsoft.com/office/powerpoint/2010/main" val="3375258265"/>
+      </p:ext>
+    </p:extLst>
+  </p:cSld>
+  <p:clrMapOvr>
+    <a:masterClrMapping/>
+  </p:clrMapOvr>
+</p:sld>
+</file>
+
+<file path=ppt/slides/slide11.xml><?xml version="1.0" encoding="utf-8"?>
+<p:sld xmlns:a="http://schemas.openxmlformats.org/drawingml/2006/main" xmlns:r="http://schemas.openxmlformats.org/officeDocument/2006/relationships" xmlns:p="http://schemas.openxmlformats.org/presentationml/2006/main">
+  <p:cSld>
+    <p:bg>
+      <p:bgPr>
+        <a:solidFill>
+          <a:schemeClr val="bg1"/>
+        </a:solidFill>
+        <a:effectLst/>
+      </p:bgPr>
+    </p:bg>
+    <p:spTree>
+      <p:nvGrpSpPr>
+        <p:cNvPr id="1" name=""/>
+        <p:cNvGrpSpPr/>
+        <p:nvPr/>
+      </p:nvGrpSpPr>
+      <p:grpSpPr>
+        <a:xfrm>
+          <a:off x="0" y="0"/>
+          <a:ext cx="0" cy="0"/>
+          <a:chOff x="0" y="0"/>
+          <a:chExt cx="0" cy="0"/>
+        </a:xfrm>
+      </p:grpSpPr>
+      <p:sp>
+        <p:nvSpPr>
+          <p:cNvPr id="2" name="Title 1">
+            <a:extLst>
+              <a:ext uri="{FF2B5EF4-FFF2-40B4-BE49-F238E27FC236}">
+                <a16:creationId xmlns:a16="http://schemas.microsoft.com/office/drawing/2014/main" id="{056DF815-A444-4BA6-9D43-A7F5B28FB2DC}"/>
+              </a:ext>
+            </a:extLst>
+          </p:cNvPr>
+          <p:cNvSpPr>
+            <a:spLocks noGrp="1"/>
+          </p:cNvSpPr>
+          <p:nvPr>
+            <p:ph type="title"/>
+          </p:nvPr>
+        </p:nvSpPr>
+        <p:spPr>
+          <a:xfrm>
+            <a:off x="492918" y="499533"/>
+            <a:ext cx="8079581" cy="1658198"/>
+          </a:xfrm>
+        </p:spPr>
+        <p:txBody>
+          <a:bodyPr>
+            <a:normAutofit/>
+          </a:bodyPr>
+          <a:lstStyle/>
+          <a:p>
+            <a:r>
+              <a:rPr lang="bg-BG" dirty="0"/>
+              <a:t>Процес на работа</a:t>
+            </a:r>
+            <a:endParaRPr lang="en-US" dirty="0"/>
+          </a:p>
+        </p:txBody>
+      </p:sp>
+      <p:sp>
+        <p:nvSpPr>
+          <p:cNvPr id="3" name="Content Placeholder 2">
+            <a:extLst>
+              <a:ext uri="{FF2B5EF4-FFF2-40B4-BE49-F238E27FC236}">
+                <a16:creationId xmlns:a16="http://schemas.microsoft.com/office/drawing/2014/main" id="{FC75B038-0559-454F-A7B0-B0E3E0894627}"/>
+              </a:ext>
+            </a:extLst>
+          </p:cNvPr>
+          <p:cNvSpPr>
+            <a:spLocks noGrp="1"/>
+          </p:cNvSpPr>
+          <p:nvPr>
+            <p:ph idx="1"/>
+          </p:nvPr>
+        </p:nvSpPr>
+        <p:spPr>
+          <a:xfrm>
+            <a:off x="507492" y="2011680"/>
+            <a:ext cx="5156708" cy="3766185"/>
+          </a:xfrm>
+        </p:spPr>
+        <p:txBody>
+          <a:bodyPr>
+            <a:normAutofit/>
+          </a:bodyPr>
+          <a:lstStyle/>
+          <a:p>
+            <a:pPr algn="just"/>
+            <a:r>
+              <a:rPr lang="bg-BG" dirty="0"/>
+              <a:t>Процесът на работа премина леко и небрежно. Всички членове на екипа се сработиха идеално, помагайки си в изработката на проекта. Забавлявахме се докато работим и времето премина неусетно!</a:t>
+            </a:r>
+          </a:p>
+        </p:txBody>
+      </p:sp>
+      <p:pic>
+        <p:nvPicPr>
+          <p:cNvPr id="7" name="Picture 6" descr="A close up of text on a black background&#10;&#10;Description automatically generated">
+            <a:extLst>
+              <a:ext uri="{FF2B5EF4-FFF2-40B4-BE49-F238E27FC236}">
+                <a16:creationId xmlns:a16="http://schemas.microsoft.com/office/drawing/2014/main" id="{30C52446-6E4C-482E-ACF5-6F685882CC95}"/>
+              </a:ext>
+            </a:extLst>
+          </p:cNvPr>
+          <p:cNvPicPr>
+            <a:picLocks noChangeAspect="1"/>
+          </p:cNvPicPr>
+          <p:nvPr/>
+        </p:nvPicPr>
+        <p:blipFill>
+          <a:blip r:embed="rId2">
+            <a:extLst>
+              <a:ext uri="{28A0092B-C50C-407E-A947-70E740481C1C}">
+                <a14:useLocalDpi xmlns:a14="http://schemas.microsoft.com/office/drawing/2010/main" val="0"/>
+              </a:ext>
+            </a:extLst>
+          </a:blip>
+          <a:stretch>
+            <a:fillRect/>
+          </a:stretch>
+        </p:blipFill>
+        <p:spPr>
+          <a:xfrm>
+            <a:off x="5410200" y="2658030"/>
+            <a:ext cx="3437970" cy="3437970"/>
+          </a:xfrm>
+          <a:prstGeom prst="rect">
+            <a:avLst/>
+          </a:prstGeom>
+        </p:spPr>
+      </p:pic>
+    </p:spTree>
+    <p:extLst>
+      <p:ext uri="{BB962C8B-B14F-4D97-AF65-F5344CB8AC3E}">
+        <p14:creationId xmlns:p14="http://schemas.microsoft.com/office/powerpoint/2010/main" val="248696584"/>
+      </p:ext>
+    </p:extLst>
+  </p:cSld>
+  <p:clrMapOvr>
+    <a:masterClrMapping/>
+  </p:clrMapOvr>
+</p:sld>
+</file>
+
+<file path=ppt/slides/slide12.xml><?xml version="1.0" encoding="utf-8"?>
+<p:sld xmlns:a="http://schemas.openxmlformats.org/drawingml/2006/main" xmlns:r="http://schemas.openxmlformats.org/officeDocument/2006/relationships" xmlns:p="http://schemas.openxmlformats.org/presentationml/2006/main">
+  <p:cSld>
+    <p:spTree>
+      <p:nvGrpSpPr>
+        <p:cNvPr id="1" name=""/>
+        <p:cNvGrpSpPr/>
+        <p:nvPr/>
+      </p:nvGrpSpPr>
+      <p:grpSpPr>
+        <a:xfrm>
+          <a:off x="0" y="0"/>
+          <a:ext cx="0" cy="0"/>
+          <a:chOff x="0" y="0"/>
+          <a:chExt cx="0" cy="0"/>
+        </a:xfrm>
+      </p:grpSpPr>
+      <p:sp>
+        <p:nvSpPr>
           <p:cNvPr id="3" name="Заглавие 2"/>
           <p:cNvSpPr>
             <a:spLocks noGrp="1"/>
@@ -3639,109 +3919,139 @@
           </a:p>
           <a:p>
             <a:r>
-              <a:rPr lang="bg-BG" dirty="0"/>
+              <a:rPr lang="bg-BG" sz="1200" dirty="0"/>
               <a:t>Емил Йорданов - </a:t>
             </a:r>
             <a:r>
-              <a:rPr lang="en-US" dirty="0"/>
+              <a:rPr lang="en-US" sz="1200" dirty="0"/>
               <a:t>C#/ HTML/ CSS</a:t>
             </a:r>
             <a:r>
-              <a:rPr lang="bg-BG" dirty="0"/>
+              <a:rPr lang="bg-BG" sz="1200" dirty="0"/>
               <a:t> </a:t>
             </a:r>
             <a:r>
-              <a:rPr lang="en-US" dirty="0"/>
+              <a:rPr lang="en-US" sz="1200" dirty="0"/>
               <a:t>dev</a:t>
             </a:r>
             <a:r>
-              <a:rPr lang="bg-BG" dirty="0"/>
+              <a:rPr lang="bg-BG" sz="1200" dirty="0"/>
               <a:t>, презентатор</a:t>
             </a:r>
           </a:p>
           <a:p>
-            <a:r>
-              <a:rPr lang="bg-BG" dirty="0"/>
+            <a:pPr lvl="1"/>
+            <a:r>
+              <a:rPr lang="en-US" sz="1200" dirty="0"/>
+              <a:t>Rooms &amp; Reservations </a:t>
+            </a:r>
+            <a:r>
+              <a:rPr lang="en-US" sz="1200" dirty="0" err="1"/>
+              <a:t>ViewModel</a:t>
+            </a:r>
+            <a:r>
+              <a:rPr lang="en-US" sz="1200" dirty="0"/>
+              <a:t> and Controller, GitHub SETUP, Role Validation</a:t>
+            </a:r>
+            <a:endParaRPr lang="bg-BG" sz="1200" dirty="0"/>
+          </a:p>
+          <a:p>
+            <a:r>
+              <a:rPr lang="bg-BG" sz="1200" dirty="0"/>
               <a:t>Кристиан Тодоров</a:t>
             </a:r>
             <a:r>
-              <a:rPr lang="en-US" dirty="0"/>
+              <a:rPr lang="en-US" sz="1200" dirty="0"/>
               <a:t> – C#/ HTML/ CSS/ JS dev</a:t>
             </a:r>
-            <a:endParaRPr lang="bg-BG" dirty="0"/>
-          </a:p>
-          <a:p>
-            <a:r>
-              <a:rPr lang="bg-BG" dirty="0"/>
+          </a:p>
+          <a:p>
+            <a:pPr lvl="1"/>
+            <a:r>
+              <a:rPr lang="en-US" sz="1200" dirty="0"/>
+              <a:t>Users &amp; Clients </a:t>
+            </a:r>
+            <a:r>
+              <a:rPr lang="en-US" sz="1200" dirty="0" err="1"/>
+              <a:t>ViewModel</a:t>
+            </a:r>
+            <a:r>
+              <a:rPr lang="en-US" sz="1200" dirty="0"/>
+              <a:t> and Controller, GitHub SETUP, Index filtering</a:t>
+            </a:r>
+            <a:endParaRPr lang="bg-BG" sz="1200" dirty="0"/>
+          </a:p>
+          <a:p>
+            <a:r>
+              <a:rPr lang="bg-BG" sz="1200" dirty="0"/>
               <a:t>Иван Досев – Дизайнер, Тестер, </a:t>
             </a:r>
             <a:r>
-              <a:rPr lang="en-US" dirty="0"/>
+              <a:rPr lang="en-US" sz="1200" dirty="0"/>
               <a:t>PowerPoint master</a:t>
             </a:r>
-            <a:endParaRPr lang="bg-BG" dirty="0"/>
-          </a:p>
-          <a:p>
-            <a:r>
-              <a:rPr lang="bg-BG" dirty="0"/>
+            <a:endParaRPr lang="bg-BG" sz="1200" dirty="0"/>
+          </a:p>
+          <a:p>
+            <a:r>
+              <a:rPr lang="bg-BG" sz="1200" dirty="0"/>
               <a:t>Мирослав Петров – </a:t>
             </a:r>
             <a:r>
-              <a:rPr lang="en-US"/>
-              <a:t>C#/ HTML</a:t>
-            </a:r>
-            <a:r>
-              <a:rPr lang="en-US" dirty="0"/>
-              <a:t>/ </a:t>
-            </a:r>
-            <a:r>
-              <a:rPr lang="en-US"/>
-              <a:t>CSS dev</a:t>
-            </a:r>
-            <a:endParaRPr lang="bg-BG" dirty="0"/>
-          </a:p>
-          <a:p>
-            <a:r>
-              <a:rPr lang="bg-BG" dirty="0"/>
+              <a:rPr lang="en-US" sz="1200" dirty="0"/>
+              <a:t>C#/ HTML/ CSS dev</a:t>
+            </a:r>
+          </a:p>
+          <a:p>
+            <a:pPr lvl="1"/>
+            <a:r>
+              <a:rPr lang="en-US" sz="1200" dirty="0"/>
+              <a:t>Administrator &amp; User Menu &amp; Controller, CSS styling</a:t>
+            </a:r>
+            <a:endParaRPr lang="bg-BG" sz="1200" dirty="0"/>
+          </a:p>
+          <a:p>
+            <a:r>
+              <a:rPr lang="bg-BG" sz="1200" dirty="0"/>
               <a:t>Василена Димитрова</a:t>
             </a:r>
             <a:r>
-              <a:rPr lang="en-US" dirty="0"/>
+              <a:rPr lang="en-US" sz="1200" dirty="0"/>
               <a:t> – </a:t>
             </a:r>
             <a:r>
-              <a:rPr lang="bg-BG" dirty="0"/>
+              <a:rPr lang="bg-BG" sz="1200" dirty="0"/>
               <a:t>Тестер и Дизайнер</a:t>
             </a:r>
           </a:p>
           <a:p>
             <a:r>
-              <a:rPr lang="bg-BG" dirty="0"/>
+              <a:rPr lang="bg-BG" sz="1200" dirty="0"/>
               <a:t>Иван Недков</a:t>
             </a:r>
             <a:r>
-              <a:rPr lang="en-US" dirty="0"/>
+              <a:rPr lang="en-US" sz="1200" dirty="0"/>
               <a:t> - </a:t>
             </a:r>
             <a:r>
-              <a:rPr lang="bg-BG" dirty="0"/>
+              <a:rPr lang="bg-BG" sz="1200" dirty="0"/>
               <a:t>Тестер</a:t>
             </a:r>
           </a:p>
           <a:p>
             <a:r>
-              <a:rPr lang="bg-BG" dirty="0"/>
+              <a:rPr lang="bg-BG" sz="1200" dirty="0"/>
               <a:t>Даниел Николов</a:t>
             </a:r>
             <a:r>
-              <a:rPr lang="en-US" dirty="0"/>
+              <a:rPr lang="en-US" sz="1200" dirty="0"/>
               <a:t> - </a:t>
             </a:r>
             <a:r>
-              <a:rPr lang="bg-BG" dirty="0"/>
+              <a:rPr lang="bg-BG" sz="1200" dirty="0"/>
               <a:t>Тестер</a:t>
             </a:r>
-            <a:endParaRPr lang="en-US" dirty="0"/>
+            <a:endParaRPr lang="en-US" sz="1200" dirty="0"/>
           </a:p>
         </p:txBody>
       </p:sp>
@@ -3975,6 +4285,7 @@
           <a:bodyPr/>
           <a:lstStyle/>
           <a:p>
+            <a:pPr algn="just"/>
             <a:r>
               <a:rPr lang="en-US" dirty="0"/>
               <a:t>HotelSYS </a:t>
@@ -3985,19 +4296,17 @@
             </a:r>
           </a:p>
           <a:p>
+            <a:pPr algn="just"/>
             <a:r>
               <a:rPr lang="bg-BG" dirty="0"/>
               <a:t>Използва се за създаване на нова резервация, изчисляване на дължимата сума според броя нощувки и вид на заетата стая.</a:t>
             </a:r>
           </a:p>
           <a:p>
+            <a:pPr algn="just"/>
             <a:r>
               <a:rPr lang="bg-BG" dirty="0"/>
-              <a:t>Има доказана сигурност в защитата и много </a:t>
-            </a:r>
-            <a:r>
-              <a:rPr lang="bg-BG"/>
-              <a:t>готин дизайн!</a:t>
+              <a:t>Има доказана сигурност в защитата и много готин дизайн!</a:t>
             </a:r>
             <a:endParaRPr lang="en-US" dirty="0"/>
           </a:p>
@@ -4130,17 +4439,42 @@
             </a:r>
           </a:p>
           <a:p>
+            <a:endParaRPr lang="en-US" dirty="0"/>
+          </a:p>
+          <a:p>
+            <a:r>
+              <a:rPr lang="en-US" dirty="0"/>
+              <a:t> </a:t>
+            </a:r>
             <a:r>
               <a:rPr lang="bg-BG" dirty="0"/>
-              <a:t>Използвани програми: </a:t>
+              <a:t>Използвани програми:</a:t>
+            </a:r>
+            <a:endParaRPr lang="en-US" dirty="0"/>
+          </a:p>
+          <a:p>
+            <a:pPr lvl="1"/>
+            <a:r>
+              <a:rPr lang="bg-BG" dirty="0"/>
+              <a:t> </a:t>
             </a:r>
             <a:r>
               <a:rPr lang="en-US" dirty="0"/>
-              <a:t>Visual Studio 2019, SQL Server Management Studio (SSMS) </a:t>
-            </a:r>
-            <a:r>
-              <a:rPr lang="bg-BG" dirty="0"/>
-              <a:t>и </a:t>
+              <a:t>Visual Studio 2019 Community Edition;</a:t>
+            </a:r>
+          </a:p>
+          <a:p>
+            <a:pPr lvl="1"/>
+            <a:r>
+              <a:rPr lang="en-US" dirty="0"/>
+              <a:t> SQL Server Management Studio (SSMS);</a:t>
+            </a:r>
+          </a:p>
+          <a:p>
+            <a:pPr lvl="1"/>
+            <a:r>
+              <a:rPr lang="en-US" dirty="0"/>
+              <a:t> </a:t>
             </a:r>
             <a:r>
               <a:rPr lang="en-US" dirty="0" err="1"/>
@@ -4148,7 +4482,14 @@
             </a:r>
             <a:r>
               <a:rPr lang="en-US" dirty="0"/>
-              <a:t>++</a:t>
+              <a:t>++;</a:t>
+            </a:r>
+          </a:p>
+          <a:p>
+            <a:pPr lvl="1"/>
+            <a:r>
+              <a:rPr lang="en-US" dirty="0"/>
+              <a:t> Visual Studio Code;</a:t>
             </a:r>
           </a:p>
           <a:p>
@@ -4424,24 +4765,28 @@
           <a:bodyPr/>
           <a:lstStyle/>
           <a:p>
+            <a:pPr algn="just"/>
             <a:r>
               <a:rPr lang="bg-BG" dirty="0"/>
               <a:t>Първо се създава потребител, като се въвеждат всички задължителни полета.</a:t>
             </a:r>
           </a:p>
           <a:p>
+            <a:pPr algn="just"/>
             <a:r>
               <a:rPr lang="bg-BG" dirty="0"/>
               <a:t>Следва регистрираният да си избере стая и да я резервира, с което той става клиент.</a:t>
             </a:r>
           </a:p>
           <a:p>
+            <a:pPr algn="just"/>
             <a:r>
               <a:rPr lang="bg-BG" dirty="0"/>
               <a:t>Ако избраната от него стая е заета, то той трябва да си избере друга.</a:t>
             </a:r>
           </a:p>
           <a:p>
+            <a:pPr algn="just"/>
             <a:r>
               <a:rPr lang="bg-BG" dirty="0"/>
               <a:t>При изборът на стая има и екстри, които могат да се изберат, като те ще повлияят на крайната цена.</a:t>

</xml_diff>